<commit_message>
All the files used till this date
</commit_message>
<xml_diff>
--- a/Mid Point Review - April 1.pptx
+++ b/Mid Point Review - April 1.pptx
@@ -263,7 +263,7 @@
   </p:defaultTextStyle>
   <p:extLst>
     <p:ext uri="GoogleSlidesCustomDataVersion2">
-      <go:slidesCustomData xmlns:go="http://customooxmlschemas.google.com/" r:id="rId22" roundtripDataSignature="AMtx7mg6PVX/2emgliOYmQ4U5P5QddoYnw=="/>
+      <go:slidesCustomData xmlns:go="http://customooxmlschemas.google.com/" r:id="rId22" roundtripDataSignature="AMtx7mhQJy+cfr3Wzv8B20pqi/U8prdCCw=="/>
     </p:ext>
   </p:extLst>
 </p:presentation>
@@ -799,7 +799,7 @@
   <p:cSld>
     <p:spTree>
       <p:nvGrpSpPr>
-        <p:cNvPr id="142" name="Shape 142"/>
+        <p:cNvPr id="139" name="Shape 139"/>
         <p:cNvGrpSpPr/>
         <p:nvPr/>
       </p:nvGrpSpPr>
@@ -813,7 +813,7 @@
       </p:grpSpPr>
       <p:sp>
         <p:nvSpPr>
-          <p:cNvPr id="143" name="Google Shape;143;g34735e9ccf9_0_89:notes"/>
+          <p:cNvPr id="140" name="Google Shape;140;g34735e9ccf9_0_89:notes"/>
           <p:cNvSpPr/>
           <p:nvPr>
             <p:ph idx="2" type="sldImg"/>
@@ -848,7 +848,7 @@
       </p:sp>
       <p:sp>
         <p:nvSpPr>
-          <p:cNvPr id="144" name="Google Shape;144;g34735e9ccf9_0_89:notes"/>
+          <p:cNvPr id="141" name="Google Shape;141;g34735e9ccf9_0_89:notes"/>
           <p:cNvSpPr txBox="1"/>
           <p:nvPr>
             <p:ph idx="1" type="body"/>
@@ -898,7 +898,7 @@
   <p:cSld>
     <p:spTree>
       <p:nvGrpSpPr>
-        <p:cNvPr id="150" name="Shape 150"/>
+        <p:cNvPr id="147" name="Shape 147"/>
         <p:cNvGrpSpPr/>
         <p:nvPr/>
       </p:nvGrpSpPr>
@@ -912,7 +912,7 @@
       </p:grpSpPr>
       <p:sp>
         <p:nvSpPr>
-          <p:cNvPr id="151" name="Google Shape;151;g34735e9ccf9_0_97:notes"/>
+          <p:cNvPr id="148" name="Google Shape;148;g34735e9ccf9_0_97:notes"/>
           <p:cNvSpPr/>
           <p:nvPr>
             <p:ph idx="2" type="sldImg"/>
@@ -947,7 +947,7 @@
       </p:sp>
       <p:sp>
         <p:nvSpPr>
-          <p:cNvPr id="152" name="Google Shape;152;g34735e9ccf9_0_97:notes"/>
+          <p:cNvPr id="149" name="Google Shape;149;g34735e9ccf9_0_97:notes"/>
           <p:cNvSpPr txBox="1"/>
           <p:nvPr>
             <p:ph idx="1" type="body"/>
@@ -997,7 +997,7 @@
   <p:cSld>
     <p:spTree>
       <p:nvGrpSpPr>
-        <p:cNvPr id="157" name="Shape 157"/>
+        <p:cNvPr id="154" name="Shape 154"/>
         <p:cNvGrpSpPr/>
         <p:nvPr/>
       </p:nvGrpSpPr>
@@ -1011,7 +1011,7 @@
       </p:grpSpPr>
       <p:sp>
         <p:nvSpPr>
-          <p:cNvPr id="158" name="Google Shape;158;g34735e9ccf9_10_188:notes"/>
+          <p:cNvPr id="155" name="Google Shape;155;g34735e9ccf9_10_188:notes"/>
           <p:cNvSpPr/>
           <p:nvPr>
             <p:ph idx="2" type="sldImg"/>
@@ -1056,7 +1056,7 @@
       </p:sp>
       <p:sp>
         <p:nvSpPr>
-          <p:cNvPr id="159" name="Google Shape;159;g34735e9ccf9_10_188:notes"/>
+          <p:cNvPr id="156" name="Google Shape;156;g34735e9ccf9_10_188:notes"/>
           <p:cNvSpPr txBox="1"/>
           <p:nvPr>
             <p:ph idx="1" type="body"/>
@@ -1231,7 +1231,7 @@
   <p:cSld>
     <p:spTree>
       <p:nvGrpSpPr>
-        <p:cNvPr id="84" name="Shape 84"/>
+        <p:cNvPr id="81" name="Shape 81"/>
         <p:cNvGrpSpPr/>
         <p:nvPr/>
       </p:nvGrpSpPr>
@@ -1245,7 +1245,7 @@
       </p:grpSpPr>
       <p:sp>
         <p:nvSpPr>
-          <p:cNvPr id="85" name="Google Shape;85;g34735e9ccf9_10_51:notes"/>
+          <p:cNvPr id="82" name="Google Shape;82;g34735e9ccf9_10_51:notes"/>
           <p:cNvSpPr/>
           <p:nvPr>
             <p:ph idx="2" type="sldImg"/>
@@ -1290,7 +1290,7 @@
       </p:sp>
       <p:sp>
         <p:nvSpPr>
-          <p:cNvPr id="86" name="Google Shape;86;g34735e9ccf9_10_51:notes"/>
+          <p:cNvPr id="83" name="Google Shape;83;g34735e9ccf9_10_51:notes"/>
           <p:cNvSpPr txBox="1"/>
           <p:nvPr>
             <p:ph idx="1" type="body"/>
@@ -1348,7 +1348,7 @@
   <p:cSld>
     <p:spTree>
       <p:nvGrpSpPr>
-        <p:cNvPr id="95" name="Shape 95"/>
+        <p:cNvPr id="92" name="Shape 92"/>
         <p:cNvGrpSpPr/>
         <p:nvPr/>
       </p:nvGrpSpPr>
@@ -1362,7 +1362,7 @@
       </p:grpSpPr>
       <p:sp>
         <p:nvSpPr>
-          <p:cNvPr id="96" name="Google Shape;96;g34735e9ccf9_10_123:notes"/>
+          <p:cNvPr id="93" name="Google Shape;93;g34735e9ccf9_10_123:notes"/>
           <p:cNvSpPr/>
           <p:nvPr>
             <p:ph idx="2" type="sldImg"/>
@@ -1407,7 +1407,7 @@
       </p:sp>
       <p:sp>
         <p:nvSpPr>
-          <p:cNvPr id="97" name="Google Shape;97;g34735e9ccf9_10_123:notes"/>
+          <p:cNvPr id="94" name="Google Shape;94;g34735e9ccf9_10_123:notes"/>
           <p:cNvSpPr txBox="1"/>
           <p:nvPr>
             <p:ph idx="1" type="body"/>
@@ -1465,7 +1465,7 @@
   <p:cSld>
     <p:spTree>
       <p:nvGrpSpPr>
-        <p:cNvPr id="107" name="Shape 107"/>
+        <p:cNvPr id="104" name="Shape 104"/>
         <p:cNvGrpSpPr/>
         <p:nvPr/>
       </p:nvGrpSpPr>
@@ -1479,7 +1479,7 @@
       </p:grpSpPr>
       <p:sp>
         <p:nvSpPr>
-          <p:cNvPr id="108" name="Google Shape;108;g34735e9ccf9_10_140:notes"/>
+          <p:cNvPr id="105" name="Google Shape;105;g34735e9ccf9_10_140:notes"/>
           <p:cNvSpPr/>
           <p:nvPr>
             <p:ph idx="2" type="sldImg"/>
@@ -1524,7 +1524,7 @@
       </p:sp>
       <p:sp>
         <p:nvSpPr>
-          <p:cNvPr id="109" name="Google Shape;109;g34735e9ccf9_10_140:notes"/>
+          <p:cNvPr id="106" name="Google Shape;106;g34735e9ccf9_10_140:notes"/>
           <p:cNvSpPr txBox="1"/>
           <p:nvPr>
             <p:ph idx="1" type="body"/>
@@ -1582,7 +1582,7 @@
   <p:cSld>
     <p:spTree>
       <p:nvGrpSpPr>
-        <p:cNvPr id="114" name="Shape 114"/>
+        <p:cNvPr id="111" name="Shape 111"/>
         <p:cNvGrpSpPr/>
         <p:nvPr/>
       </p:nvGrpSpPr>
@@ -1596,7 +1596,7 @@
       </p:grpSpPr>
       <p:sp>
         <p:nvSpPr>
-          <p:cNvPr id="115" name="Google Shape;115;g34735e9ccf9_8_13:notes"/>
+          <p:cNvPr id="112" name="Google Shape;112;g34735e9ccf9_8_13:notes"/>
           <p:cNvSpPr/>
           <p:nvPr>
             <p:ph idx="2" type="sldImg"/>
@@ -1631,7 +1631,7 @@
       </p:sp>
       <p:sp>
         <p:nvSpPr>
-          <p:cNvPr id="116" name="Google Shape;116;g34735e9ccf9_8_13:notes"/>
+          <p:cNvPr id="113" name="Google Shape;113;g34735e9ccf9_8_13:notes"/>
           <p:cNvSpPr txBox="1"/>
           <p:nvPr>
             <p:ph idx="1" type="body"/>
@@ -1681,7 +1681,7 @@
   <p:cSld>
     <p:spTree>
       <p:nvGrpSpPr>
-        <p:cNvPr id="121" name="Shape 121"/>
+        <p:cNvPr id="118" name="Shape 118"/>
         <p:cNvGrpSpPr/>
         <p:nvPr/>
       </p:nvGrpSpPr>
@@ -1695,7 +1695,7 @@
       </p:grpSpPr>
       <p:sp>
         <p:nvSpPr>
-          <p:cNvPr id="122" name="Google Shape;122;g34735e9ccf9_8_21:notes"/>
+          <p:cNvPr id="119" name="Google Shape;119;g34735e9ccf9_8_21:notes"/>
           <p:cNvSpPr/>
           <p:nvPr>
             <p:ph idx="2" type="sldImg"/>
@@ -1730,7 +1730,7 @@
       </p:sp>
       <p:sp>
         <p:nvSpPr>
-          <p:cNvPr id="123" name="Google Shape;123;g34735e9ccf9_8_21:notes"/>
+          <p:cNvPr id="120" name="Google Shape;120;g34735e9ccf9_8_21:notes"/>
           <p:cNvSpPr txBox="1"/>
           <p:nvPr>
             <p:ph idx="1" type="body"/>
@@ -1780,7 +1780,7 @@
   <p:cSld>
     <p:spTree>
       <p:nvGrpSpPr>
-        <p:cNvPr id="127" name="Shape 127"/>
+        <p:cNvPr id="124" name="Shape 124"/>
         <p:cNvGrpSpPr/>
         <p:nvPr/>
       </p:nvGrpSpPr>
@@ -1794,7 +1794,7 @@
       </p:grpSpPr>
       <p:sp>
         <p:nvSpPr>
-          <p:cNvPr id="128" name="Google Shape;128;g34735e9ccf9_10_160:notes"/>
+          <p:cNvPr id="125" name="Google Shape;125;g34735e9ccf9_10_160:notes"/>
           <p:cNvSpPr/>
           <p:nvPr>
             <p:ph idx="2" type="sldImg"/>
@@ -1839,7 +1839,7 @@
       </p:sp>
       <p:sp>
         <p:nvSpPr>
-          <p:cNvPr id="129" name="Google Shape;129;g34735e9ccf9_10_160:notes"/>
+          <p:cNvPr id="126" name="Google Shape;126;g34735e9ccf9_10_160:notes"/>
           <p:cNvSpPr txBox="1"/>
           <p:nvPr>
             <p:ph idx="1" type="body"/>
@@ -1897,7 +1897,7 @@
   <p:cSld>
     <p:spTree>
       <p:nvGrpSpPr>
-        <p:cNvPr id="134" name="Shape 134"/>
+        <p:cNvPr id="131" name="Shape 131"/>
         <p:cNvGrpSpPr/>
         <p:nvPr/>
       </p:nvGrpSpPr>
@@ -1911,7 +1911,7 @@
       </p:grpSpPr>
       <p:sp>
         <p:nvSpPr>
-          <p:cNvPr id="135" name="Google Shape;135;g34735e9ccf9_10_167:notes"/>
+          <p:cNvPr id="132" name="Google Shape;132;g34735e9ccf9_10_167:notes"/>
           <p:cNvSpPr/>
           <p:nvPr>
             <p:ph idx="2" type="sldImg"/>
@@ -1956,7 +1956,7 @@
       </p:sp>
       <p:sp>
         <p:nvSpPr>
-          <p:cNvPr id="136" name="Google Shape;136;g34735e9ccf9_10_167:notes"/>
+          <p:cNvPr id="133" name="Google Shape;133;g34735e9ccf9_10_167:notes"/>
           <p:cNvSpPr txBox="1"/>
           <p:nvPr>
             <p:ph idx="1" type="body"/>
@@ -8603,7 +8603,7 @@
         <p:spPr>
           <a:xfrm>
             <a:off x="0" y="0"/>
-            <a:ext cx="12191999" cy="6857999"/>
+            <a:ext cx="9064624" cy="5098850"/>
           </a:xfrm>
           <a:prstGeom prst="rect">
             <a:avLst/>
@@ -8630,7 +8630,7 @@
         <p:spPr>
           <a:xfrm>
             <a:off x="0" y="0"/>
-            <a:ext cx="12191999" cy="6857999"/>
+            <a:ext cx="12191985" cy="6857999"/>
           </a:xfrm>
           <a:prstGeom prst="rect">
             <a:avLst/>
@@ -8657,7 +8657,7 @@
         <p:spPr>
           <a:xfrm>
             <a:off x="0" y="0"/>
-            <a:ext cx="12191999" cy="6857999"/>
+            <a:ext cx="12191976" cy="6857991"/>
           </a:xfrm>
           <a:prstGeom prst="rect">
             <a:avLst/>
@@ -9447,7 +9447,56 @@
                 <a:cs typeface="Calibri"/>
                 <a:sym typeface="Calibri"/>
               </a:rPr>
-              <a:t>GlobalGiving: Strategic Financial Benchmarking</a:t>
+              <a:t>GlobalGiving</a:t>
+            </a:r>
+            <a:r>
+              <a:rPr lang="en-US" sz="5000">
+                <a:solidFill>
+                  <a:schemeClr val="lt1"/>
+                </a:solidFill>
+                <a:latin typeface="Calibri"/>
+                <a:ea typeface="Calibri"/>
+                <a:cs typeface="Calibri"/>
+                <a:sym typeface="Calibri"/>
+              </a:rPr>
+              <a:t>: </a:t>
+            </a:r>
+            <a:endParaRPr sz="5000">
+              <a:solidFill>
+                <a:schemeClr val="lt1"/>
+              </a:solidFill>
+              <a:latin typeface="Calibri"/>
+              <a:ea typeface="Calibri"/>
+              <a:cs typeface="Calibri"/>
+              <a:sym typeface="Calibri"/>
+            </a:endParaRPr>
+          </a:p>
+          <a:p>
+            <a:pPr indent="0" lvl="0" marL="0" rtl="0" algn="ctr">
+              <a:spcBef>
+                <a:spcPts val="0"/>
+              </a:spcBef>
+              <a:spcAft>
+                <a:spcPts val="0"/>
+              </a:spcAft>
+              <a:buClr>
+                <a:schemeClr val="dk1"/>
+              </a:buClr>
+              <a:buSzPts val="6000"/>
+              <a:buFont typeface="Play"/>
+              <a:buNone/>
+            </a:pPr>
+            <a:r>
+              <a:rPr lang="en-US" sz="5000">
+                <a:solidFill>
+                  <a:schemeClr val="lt1"/>
+                </a:solidFill>
+                <a:latin typeface="Calibri"/>
+                <a:ea typeface="Calibri"/>
+                <a:cs typeface="Calibri"/>
+                <a:sym typeface="Calibri"/>
+              </a:rPr>
+              <a:t>Strategic Financial Benchmarking</a:t>
             </a:r>
             <a:endParaRPr>
               <a:solidFill>
@@ -9694,7 +9743,7 @@
             </a:endParaRPr>
           </a:p>
           <a:p>
-            <a:pPr indent="0" lvl="0" marL="0" rtl="0" algn="l">
+            <a:pPr indent="0" lvl="0" marL="0" rtl="0" algn="ctr">
               <a:lnSpc>
                 <a:spcPct val="90000"/>
               </a:lnSpc>
@@ -9730,7 +9779,7 @@
   <p:cSld>
     <p:spTree>
       <p:nvGrpSpPr>
-        <p:cNvPr id="145" name="Shape 145"/>
+        <p:cNvPr id="142" name="Shape 142"/>
         <p:cNvGrpSpPr/>
         <p:nvPr/>
       </p:nvGrpSpPr>
@@ -9744,7 +9793,7 @@
       </p:grpSpPr>
       <p:sp>
         <p:nvSpPr>
-          <p:cNvPr id="146" name="Google Shape;146;g34735e9ccf9_0_89"/>
+          <p:cNvPr id="143" name="Google Shape;143;g34735e9ccf9_0_89"/>
           <p:cNvSpPr txBox="1"/>
           <p:nvPr>
             <p:ph type="title"/>
@@ -9796,7 +9845,7 @@
       </p:sp>
       <p:sp>
         <p:nvSpPr>
-          <p:cNvPr id="147" name="Google Shape;147;g34735e9ccf9_0_89"/>
+          <p:cNvPr id="144" name="Google Shape;144;g34735e9ccf9_0_89"/>
           <p:cNvSpPr txBox="1"/>
           <p:nvPr/>
         </p:nvSpPr>
@@ -10155,7 +10204,7 @@
       </p:sp>
       <p:sp>
         <p:nvSpPr>
-          <p:cNvPr id="148" name="Google Shape;148;g34735e9ccf9_0_89"/>
+          <p:cNvPr id="145" name="Google Shape;145;g34735e9ccf9_0_89"/>
           <p:cNvSpPr txBox="1"/>
           <p:nvPr/>
         </p:nvSpPr>
@@ -10368,7 +10417,7 @@
       </p:sp>
       <p:pic>
         <p:nvPicPr>
-          <p:cNvPr id="149" name="Google Shape;149;g34735e9ccf9_0_89"/>
+          <p:cNvPr id="146" name="Google Shape;146;g34735e9ccf9_0_89"/>
           <p:cNvPicPr preferRelativeResize="0"/>
           <p:nvPr/>
         </p:nvPicPr>
@@ -10406,7 +10455,7 @@
   <p:cSld>
     <p:spTree>
       <p:nvGrpSpPr>
-        <p:cNvPr id="153" name="Shape 153"/>
+        <p:cNvPr id="150" name="Shape 150"/>
         <p:cNvGrpSpPr/>
         <p:nvPr/>
       </p:nvGrpSpPr>
@@ -10420,7 +10469,7 @@
       </p:grpSpPr>
       <p:sp>
         <p:nvSpPr>
-          <p:cNvPr id="154" name="Google Shape;154;g34735e9ccf9_0_97"/>
+          <p:cNvPr id="151" name="Google Shape;151;g34735e9ccf9_0_97"/>
           <p:cNvSpPr txBox="1"/>
           <p:nvPr>
             <p:ph idx="1" type="body"/>
@@ -10861,7 +10910,7 @@
       </p:sp>
       <p:sp>
         <p:nvSpPr>
-          <p:cNvPr id="155" name="Google Shape;155;g34735e9ccf9_0_97"/>
+          <p:cNvPr id="152" name="Google Shape;152;g34735e9ccf9_0_97"/>
           <p:cNvSpPr txBox="1"/>
           <p:nvPr>
             <p:ph type="title"/>
@@ -10901,7 +10950,7 @@
       </p:sp>
       <p:pic>
         <p:nvPicPr>
-          <p:cNvPr id="156" name="Google Shape;156;g34735e9ccf9_0_97"/>
+          <p:cNvPr id="153" name="Google Shape;153;g34735e9ccf9_0_97"/>
           <p:cNvPicPr preferRelativeResize="0"/>
           <p:nvPr/>
         </p:nvPicPr>
@@ -10939,7 +10988,7 @@
   <p:cSld>
     <p:spTree>
       <p:nvGrpSpPr>
-        <p:cNvPr id="160" name="Shape 160"/>
+        <p:cNvPr id="157" name="Shape 157"/>
         <p:cNvGrpSpPr/>
         <p:nvPr/>
       </p:nvGrpSpPr>
@@ -10953,7 +11002,7 @@
       </p:grpSpPr>
       <p:sp>
         <p:nvSpPr>
-          <p:cNvPr id="161" name="Google Shape;161;g34735e9ccf9_10_188"/>
+          <p:cNvPr id="158" name="Google Shape;158;g34735e9ccf9_10_188"/>
           <p:cNvSpPr txBox="1"/>
           <p:nvPr/>
         </p:nvSpPr>
@@ -10995,7 +11044,7 @@
       </p:sp>
       <p:sp>
         <p:nvSpPr>
-          <p:cNvPr id="162" name="Google Shape;162;g34735e9ccf9_10_188"/>
+          <p:cNvPr id="159" name="Google Shape;159;g34735e9ccf9_10_188"/>
           <p:cNvSpPr txBox="1"/>
           <p:nvPr/>
         </p:nvSpPr>
@@ -11068,7 +11117,7 @@
       </p:sp>
       <p:pic>
         <p:nvPicPr>
-          <p:cNvPr id="163" name="Google Shape;163;g34735e9ccf9_10_188"/>
+          <p:cNvPr id="160" name="Google Shape;160;g34735e9ccf9_10_188"/>
           <p:cNvPicPr preferRelativeResize="0"/>
           <p:nvPr/>
         </p:nvPicPr>
@@ -11193,538 +11242,6 @@
           </a:ln>
         </p:spPr>
       </p:pic>
-      <p:sp>
-        <p:nvSpPr>
-          <p:cNvPr id="81" name="Google Shape;81;g34735e9ccf9_10_0"/>
-          <p:cNvSpPr txBox="1"/>
-          <p:nvPr>
-            <p:ph idx="1" type="body"/>
-          </p:nvPr>
-        </p:nvSpPr>
-        <p:spPr>
-          <a:xfrm>
-            <a:off x="164650" y="1382100"/>
-            <a:ext cx="5330700" cy="4093800"/>
-          </a:xfrm>
-          <a:prstGeom prst="rect">
-            <a:avLst/>
-          </a:prstGeom>
-          <a:noFill/>
-          <a:ln>
-            <a:noFill/>
-          </a:ln>
-        </p:spPr>
-        <p:txBody>
-          <a:bodyPr anchorCtr="0" anchor="t" bIns="45700" lIns="91425" spcFirstLastPara="1" rIns="91425" wrap="square" tIns="45700">
-            <a:noAutofit/>
-          </a:bodyPr>
-          <a:lstStyle/>
-          <a:p>
-            <a:pPr indent="0" lvl="0" marL="0" rtl="0" algn="l">
-              <a:lnSpc>
-                <a:spcPct val="115000"/>
-              </a:lnSpc>
-              <a:spcBef>
-                <a:spcPts val="1200"/>
-              </a:spcBef>
-              <a:spcAft>
-                <a:spcPts val="0"/>
-              </a:spcAft>
-              <a:buNone/>
-            </a:pPr>
-            <a:r>
-              <a:rPr b="1" lang="en-US" sz="1600">
-                <a:solidFill>
-                  <a:schemeClr val="dk1"/>
-                </a:solidFill>
-              </a:rPr>
-              <a:t>About GlobalGiving</a:t>
-            </a:r>
-            <a:endParaRPr b="1" sz="1600">
-              <a:solidFill>
-                <a:schemeClr val="dk1"/>
-              </a:solidFill>
-            </a:endParaRPr>
-          </a:p>
-          <a:p>
-            <a:pPr indent="-330200" lvl="0" marL="457200" rtl="0" algn="l">
-              <a:lnSpc>
-                <a:spcPct val="115000"/>
-              </a:lnSpc>
-              <a:spcBef>
-                <a:spcPts val="1200"/>
-              </a:spcBef>
-              <a:spcAft>
-                <a:spcPts val="0"/>
-              </a:spcAft>
-              <a:buSzPts val="1600"/>
-              <a:buChar char="●"/>
-            </a:pPr>
-            <a:r>
-              <a:rPr lang="en-US" sz="1600">
-                <a:solidFill>
-                  <a:schemeClr val="dk1"/>
-                </a:solidFill>
-              </a:rPr>
-              <a:t>Pioneering nonprofit crowdfunding platform founded over 20 years ago</a:t>
-            </a:r>
-            <a:br>
-              <a:rPr lang="en-US" sz="1600">
-                <a:solidFill>
-                  <a:schemeClr val="dk1"/>
-                </a:solidFill>
-              </a:rPr>
-            </a:br>
-            <a:endParaRPr sz="1600">
-              <a:solidFill>
-                <a:schemeClr val="dk1"/>
-              </a:solidFill>
-            </a:endParaRPr>
-          </a:p>
-          <a:p>
-            <a:pPr indent="-330200" lvl="0" marL="457200" rtl="0" algn="l">
-              <a:lnSpc>
-                <a:spcPct val="115000"/>
-              </a:lnSpc>
-              <a:spcBef>
-                <a:spcPts val="0"/>
-              </a:spcBef>
-              <a:spcAft>
-                <a:spcPts val="0"/>
-              </a:spcAft>
-              <a:buSzPts val="1600"/>
-              <a:buChar char="●"/>
-            </a:pPr>
-            <a:r>
-              <a:rPr lang="en-US" sz="1600">
-                <a:solidFill>
-                  <a:schemeClr val="dk1"/>
-                </a:solidFill>
-              </a:rPr>
-              <a:t>Has raised and distributed nearly $1 billion to charities worldwide.</a:t>
-            </a:r>
-            <a:br>
-              <a:rPr lang="en-US" sz="1600">
-                <a:solidFill>
-                  <a:schemeClr val="dk1"/>
-                </a:solidFill>
-              </a:rPr>
-            </a:br>
-            <a:endParaRPr sz="1600">
-              <a:solidFill>
-                <a:schemeClr val="dk1"/>
-              </a:solidFill>
-            </a:endParaRPr>
-          </a:p>
-          <a:p>
-            <a:pPr indent="-330200" lvl="0" marL="457200" rtl="0" algn="l">
-              <a:lnSpc>
-                <a:spcPct val="115000"/>
-              </a:lnSpc>
-              <a:spcBef>
-                <a:spcPts val="0"/>
-              </a:spcBef>
-              <a:spcAft>
-                <a:spcPts val="0"/>
-              </a:spcAft>
-              <a:buSzPts val="1600"/>
-              <a:buChar char="●"/>
-            </a:pPr>
-            <a:r>
-              <a:rPr lang="en-US" sz="1600">
-                <a:solidFill>
-                  <a:schemeClr val="dk1"/>
-                </a:solidFill>
-              </a:rPr>
-              <a:t>Known for:</a:t>
-            </a:r>
-            <a:endParaRPr sz="1600">
-              <a:solidFill>
-                <a:schemeClr val="dk1"/>
-              </a:solidFill>
-            </a:endParaRPr>
-          </a:p>
-          <a:p>
-            <a:pPr indent="-330200" lvl="1" marL="914400" rtl="0" algn="l">
-              <a:lnSpc>
-                <a:spcPct val="115000"/>
-              </a:lnSpc>
-              <a:spcBef>
-                <a:spcPts val="0"/>
-              </a:spcBef>
-              <a:spcAft>
-                <a:spcPts val="0"/>
-              </a:spcAft>
-              <a:buSzPts val="1600"/>
-              <a:buChar char="•"/>
-            </a:pPr>
-            <a:r>
-              <a:rPr lang="en-US" sz="1600">
-                <a:solidFill>
-                  <a:schemeClr val="dk1"/>
-                </a:solidFill>
-              </a:rPr>
-              <a:t>Rapid international fund distribution</a:t>
-            </a:r>
-            <a:endParaRPr sz="1600">
-              <a:solidFill>
-                <a:schemeClr val="dk1"/>
-              </a:solidFill>
-            </a:endParaRPr>
-          </a:p>
-          <a:p>
-            <a:pPr indent="-330200" lvl="1" marL="914400" rtl="0" algn="l">
-              <a:lnSpc>
-                <a:spcPct val="115000"/>
-              </a:lnSpc>
-              <a:spcBef>
-                <a:spcPts val="0"/>
-              </a:spcBef>
-              <a:spcAft>
-                <a:spcPts val="0"/>
-              </a:spcAft>
-              <a:buSzPts val="1600"/>
-              <a:buChar char="•"/>
-            </a:pPr>
-            <a:r>
-              <a:rPr lang="en-US" sz="1600">
-                <a:solidFill>
-                  <a:schemeClr val="dk1"/>
-                </a:solidFill>
-              </a:rPr>
-              <a:t>Scalable due diligence systems</a:t>
-            </a:r>
-            <a:endParaRPr sz="1600">
-              <a:solidFill>
-                <a:schemeClr val="dk1"/>
-              </a:solidFill>
-            </a:endParaRPr>
-          </a:p>
-          <a:p>
-            <a:pPr indent="-330200" lvl="1" marL="914400" rtl="0" algn="l">
-              <a:lnSpc>
-                <a:spcPct val="115000"/>
-              </a:lnSpc>
-              <a:spcBef>
-                <a:spcPts val="0"/>
-              </a:spcBef>
-              <a:spcAft>
-                <a:spcPts val="0"/>
-              </a:spcAft>
-              <a:buSzPts val="1600"/>
-              <a:buChar char="•"/>
-            </a:pPr>
-            <a:r>
-              <a:rPr lang="en-US" sz="1600">
-                <a:solidFill>
-                  <a:schemeClr val="dk1"/>
-                </a:solidFill>
-              </a:rPr>
-              <a:t>Strong partnerships with Fortune 500 companies (e.g., Ford, Nike, Pepsi)</a:t>
-            </a:r>
-            <a:endParaRPr sz="1600">
-              <a:solidFill>
-                <a:schemeClr val="dk1"/>
-              </a:solidFill>
-            </a:endParaRPr>
-          </a:p>
-          <a:p>
-            <a:pPr indent="-50800" lvl="0" marL="228600" rtl="0" algn="l">
-              <a:lnSpc>
-                <a:spcPct val="90000"/>
-              </a:lnSpc>
-              <a:spcBef>
-                <a:spcPts val="1200"/>
-              </a:spcBef>
-              <a:spcAft>
-                <a:spcPts val="0"/>
-              </a:spcAft>
-              <a:buClr>
-                <a:schemeClr val="dk1"/>
-              </a:buClr>
-              <a:buSzPts val="2800"/>
-              <a:buNone/>
-            </a:pPr>
-            <a:r>
-              <a:t/>
-            </a:r>
-            <a:endParaRPr sz="2400"/>
-          </a:p>
-        </p:txBody>
-      </p:sp>
-      <p:sp>
-        <p:nvSpPr>
-          <p:cNvPr id="82" name="Google Shape;82;g34735e9ccf9_10_0"/>
-          <p:cNvSpPr txBox="1"/>
-          <p:nvPr/>
-        </p:nvSpPr>
-        <p:spPr>
-          <a:xfrm>
-            <a:off x="6301700" y="1376025"/>
-            <a:ext cx="4981500" cy="1151400"/>
-          </a:xfrm>
-          <a:prstGeom prst="rect">
-            <a:avLst/>
-          </a:prstGeom>
-          <a:noFill/>
-          <a:ln>
-            <a:noFill/>
-          </a:ln>
-        </p:spPr>
-        <p:txBody>
-          <a:bodyPr anchorCtr="0" anchor="t" bIns="91425" lIns="91425" spcFirstLastPara="1" rIns="91425" wrap="square" tIns="91425">
-            <a:spAutoFit/>
-          </a:bodyPr>
-          <a:lstStyle/>
-          <a:p>
-            <a:pPr indent="0" lvl="0" marL="0" rtl="0" algn="l">
-              <a:lnSpc>
-                <a:spcPct val="115000"/>
-              </a:lnSpc>
-              <a:spcBef>
-                <a:spcPts val="1200"/>
-              </a:spcBef>
-              <a:spcAft>
-                <a:spcPts val="0"/>
-              </a:spcAft>
-              <a:buNone/>
-            </a:pPr>
-            <a:r>
-              <a:rPr b="1" lang="en-US" sz="1600">
-                <a:solidFill>
-                  <a:schemeClr val="dk1"/>
-                </a:solidFill>
-              </a:rPr>
-              <a:t>Project Objective</a:t>
-            </a:r>
-            <a:endParaRPr b="1" sz="1600">
-              <a:solidFill>
-                <a:schemeClr val="dk1"/>
-              </a:solidFill>
-            </a:endParaRPr>
-          </a:p>
-          <a:p>
-            <a:pPr indent="-330200" lvl="0" marL="457200" rtl="0" algn="l">
-              <a:lnSpc>
-                <a:spcPct val="115000"/>
-              </a:lnSpc>
-              <a:spcBef>
-                <a:spcPts val="1200"/>
-              </a:spcBef>
-              <a:spcAft>
-                <a:spcPts val="0"/>
-              </a:spcAft>
-              <a:buClr>
-                <a:schemeClr val="dk1"/>
-              </a:buClr>
-              <a:buSzPts val="1600"/>
-              <a:buChar char="●"/>
-            </a:pPr>
-            <a:r>
-              <a:rPr lang="en-US" sz="1600">
-                <a:solidFill>
-                  <a:schemeClr val="dk1"/>
-                </a:solidFill>
-              </a:rPr>
-              <a:t>Goal: Develop a strategy to raise $1 billion over the next 3 years</a:t>
-            </a:r>
-            <a:endParaRPr sz="1600">
-              <a:solidFill>
-                <a:schemeClr val="dk1"/>
-              </a:solidFill>
-            </a:endParaRPr>
-          </a:p>
-        </p:txBody>
-      </p:sp>
-      <p:sp>
-        <p:nvSpPr>
-          <p:cNvPr id="83" name="Google Shape;83;g34735e9ccf9_10_0"/>
-          <p:cNvSpPr txBox="1"/>
-          <p:nvPr/>
-        </p:nvSpPr>
-        <p:spPr>
-          <a:xfrm>
-            <a:off x="6301700" y="2628825"/>
-            <a:ext cx="5696700" cy="3564900"/>
-          </a:xfrm>
-          <a:prstGeom prst="rect">
-            <a:avLst/>
-          </a:prstGeom>
-          <a:noFill/>
-          <a:ln>
-            <a:noFill/>
-          </a:ln>
-        </p:spPr>
-        <p:txBody>
-          <a:bodyPr anchorCtr="0" anchor="t" bIns="91425" lIns="91425" spcFirstLastPara="1" rIns="91425" wrap="square" tIns="91425">
-            <a:spAutoFit/>
-          </a:bodyPr>
-          <a:lstStyle/>
-          <a:p>
-            <a:pPr indent="0" lvl="0" marL="0" rtl="0" algn="l">
-              <a:lnSpc>
-                <a:spcPct val="115000"/>
-              </a:lnSpc>
-              <a:spcBef>
-                <a:spcPts val="1200"/>
-              </a:spcBef>
-              <a:spcAft>
-                <a:spcPts val="0"/>
-              </a:spcAft>
-              <a:buNone/>
-            </a:pPr>
-            <a:r>
-              <a:rPr b="1" lang="en-US" sz="1600">
-                <a:solidFill>
-                  <a:schemeClr val="dk1"/>
-                </a:solidFill>
-              </a:rPr>
-              <a:t>Key Challenges </a:t>
-            </a:r>
-            <a:endParaRPr b="1" sz="1600">
-              <a:solidFill>
-                <a:schemeClr val="dk1"/>
-              </a:solidFill>
-            </a:endParaRPr>
-          </a:p>
-          <a:p>
-            <a:pPr indent="-330200" lvl="0" marL="457200" rtl="0" algn="l">
-              <a:lnSpc>
-                <a:spcPct val="115000"/>
-              </a:lnSpc>
-              <a:spcBef>
-                <a:spcPts val="1200"/>
-              </a:spcBef>
-              <a:spcAft>
-                <a:spcPts val="0"/>
-              </a:spcAft>
-              <a:buClr>
-                <a:schemeClr val="dk1"/>
-              </a:buClr>
-              <a:buSzPts val="1600"/>
-              <a:buChar char="●"/>
-            </a:pPr>
-            <a:r>
-              <a:rPr lang="en-US" sz="1600">
-                <a:solidFill>
-                  <a:schemeClr val="dk1"/>
-                </a:solidFill>
-              </a:rPr>
-              <a:t>Revenue volatility (decline in marketplace/corporate donors)</a:t>
-            </a:r>
-            <a:br>
-              <a:rPr lang="en-US" sz="1600">
-                <a:solidFill>
-                  <a:schemeClr val="dk1"/>
-                </a:solidFill>
-              </a:rPr>
-            </a:br>
-            <a:endParaRPr sz="1600">
-              <a:solidFill>
-                <a:schemeClr val="dk1"/>
-              </a:solidFill>
-            </a:endParaRPr>
-          </a:p>
-          <a:p>
-            <a:pPr indent="-330200" lvl="0" marL="457200" rtl="0" algn="l">
-              <a:lnSpc>
-                <a:spcPct val="115000"/>
-              </a:lnSpc>
-              <a:spcBef>
-                <a:spcPts val="0"/>
-              </a:spcBef>
-              <a:spcAft>
-                <a:spcPts val="0"/>
-              </a:spcAft>
-              <a:buClr>
-                <a:schemeClr val="dk1"/>
-              </a:buClr>
-              <a:buSzPts val="1600"/>
-              <a:buChar char="●"/>
-            </a:pPr>
-            <a:r>
-              <a:rPr lang="en-US" sz="1600">
-                <a:solidFill>
-                  <a:schemeClr val="dk1"/>
-                </a:solidFill>
-              </a:rPr>
-              <a:t>Slower-than-expected growth in product offerings (e.g., Atlas)</a:t>
-            </a:r>
-            <a:br>
-              <a:rPr lang="en-US" sz="1600">
-                <a:solidFill>
-                  <a:schemeClr val="dk1"/>
-                </a:solidFill>
-              </a:rPr>
-            </a:br>
-            <a:endParaRPr sz="1600">
-              <a:solidFill>
-                <a:schemeClr val="dk1"/>
-              </a:solidFill>
-            </a:endParaRPr>
-          </a:p>
-          <a:p>
-            <a:pPr indent="-342900" lvl="0" marL="457200" rtl="0" algn="l">
-              <a:lnSpc>
-                <a:spcPct val="115000"/>
-              </a:lnSpc>
-              <a:spcBef>
-                <a:spcPts val="0"/>
-              </a:spcBef>
-              <a:spcAft>
-                <a:spcPts val="0"/>
-              </a:spcAft>
-              <a:buClr>
-                <a:schemeClr val="dk1"/>
-              </a:buClr>
-              <a:buSzPts val="1800"/>
-              <a:buChar char="●"/>
-            </a:pPr>
-            <a:r>
-              <a:rPr lang="en-US" sz="1600">
-                <a:solidFill>
-                  <a:schemeClr val="dk1"/>
-                </a:solidFill>
-              </a:rPr>
-              <a:t>Budget deficit due to decreased transaction/service fee income</a:t>
-            </a:r>
-            <a:br>
-              <a:rPr lang="en-US" sz="1800">
-                <a:solidFill>
-                  <a:schemeClr val="dk1"/>
-                </a:solidFill>
-              </a:rPr>
-            </a:br>
-            <a:endParaRPr sz="1800">
-              <a:solidFill>
-                <a:schemeClr val="dk1"/>
-              </a:solidFill>
-            </a:endParaRPr>
-          </a:p>
-          <a:p>
-            <a:pPr indent="0" lvl="0" marL="457200" rtl="0" algn="l">
-              <a:lnSpc>
-                <a:spcPct val="115000"/>
-              </a:lnSpc>
-              <a:spcBef>
-                <a:spcPts val="1200"/>
-              </a:spcBef>
-              <a:spcAft>
-                <a:spcPts val="1200"/>
-              </a:spcAft>
-              <a:buNone/>
-            </a:pPr>
-            <a:r>
-              <a:t/>
-            </a:r>
-            <a:endParaRPr sz="1100">
-              <a:solidFill>
-                <a:schemeClr val="dk1"/>
-              </a:solidFill>
-            </a:endParaRPr>
-          </a:p>
-        </p:txBody>
-      </p:sp>
     </p:spTree>
   </p:cSld>
   <p:clrMapOvr>
@@ -11738,7 +11255,7 @@
   <p:cSld>
     <p:spTree>
       <p:nvGrpSpPr>
-        <p:cNvPr id="87" name="Shape 87"/>
+        <p:cNvPr id="84" name="Shape 84"/>
         <p:cNvGrpSpPr/>
         <p:nvPr/>
       </p:nvGrpSpPr>
@@ -11752,7 +11269,7 @@
       </p:grpSpPr>
       <p:pic>
         <p:nvPicPr>
-          <p:cNvPr id="88" name="Google Shape;88;g34735e9ccf9_10_51"/>
+          <p:cNvPr id="85" name="Google Shape;85;g34735e9ccf9_10_51"/>
           <p:cNvPicPr preferRelativeResize="0"/>
           <p:nvPr/>
         </p:nvPicPr>
@@ -11779,7 +11296,7 @@
       </p:pic>
       <p:sp>
         <p:nvSpPr>
-          <p:cNvPr id="89" name="Google Shape;89;g34735e9ccf9_10_51"/>
+          <p:cNvPr id="86" name="Google Shape;86;g34735e9ccf9_10_51"/>
           <p:cNvSpPr txBox="1"/>
           <p:nvPr>
             <p:ph type="title"/>
@@ -11831,7 +11348,7 @@
       </p:sp>
       <p:sp>
         <p:nvSpPr>
-          <p:cNvPr id="90" name="Google Shape;90;g34735e9ccf9_10_51"/>
+          <p:cNvPr id="87" name="Google Shape;87;g34735e9ccf9_10_51"/>
           <p:cNvSpPr txBox="1"/>
           <p:nvPr>
             <p:ph idx="1" type="body"/>
@@ -11953,7 +11470,7 @@
       </p:sp>
       <p:graphicFrame>
         <p:nvGraphicFramePr>
-          <p:cNvPr id="91" name="Google Shape;91;g34735e9ccf9_10_51"/>
+          <p:cNvPr id="88" name="Google Shape;88;g34735e9ccf9_10_51"/>
           <p:cNvGraphicFramePr/>
           <p:nvPr/>
         </p:nvGraphicFramePr>
@@ -11966,7 +11483,7 @@
             <a:tbl>
               <a:tblPr>
                 <a:noFill/>
-                <a:tableStyleId>{88496379-2F58-450E-A556-29AA8DE8CB09}</a:tableStyleId>
+                <a:tableStyleId>{26B1D847-3455-4376-BB11-FE7665B2B726}</a:tableStyleId>
               </a:tblPr>
               <a:tblGrid>
                 <a:gridCol w="2561600"/>
@@ -12450,7 +11967,7 @@
       </p:graphicFrame>
       <p:sp>
         <p:nvSpPr>
-          <p:cNvPr id="92" name="Google Shape;92;g34735e9ccf9_10_51"/>
+          <p:cNvPr id="89" name="Google Shape;89;g34735e9ccf9_10_51"/>
           <p:cNvSpPr txBox="1"/>
           <p:nvPr>
             <p:ph idx="1" type="body"/>
@@ -12505,7 +12022,7 @@
       </p:sp>
       <p:pic>
         <p:nvPicPr>
-          <p:cNvPr id="93" name="Google Shape;93;g34735e9ccf9_10_51" title="output (3).png"/>
+          <p:cNvPr id="90" name="Google Shape;90;g34735e9ccf9_10_51" title="output (3).png"/>
           <p:cNvPicPr preferRelativeResize="0"/>
           <p:nvPr/>
         </p:nvPicPr>
@@ -12533,7 +12050,7 @@
       </p:pic>
       <p:sp>
         <p:nvSpPr>
-          <p:cNvPr id="94" name="Google Shape;94;g34735e9ccf9_10_51"/>
+          <p:cNvPr id="91" name="Google Shape;91;g34735e9ccf9_10_51"/>
           <p:cNvSpPr txBox="1"/>
           <p:nvPr/>
         </p:nvSpPr>
@@ -12632,7 +12149,7 @@
   <p:cSld>
     <p:spTree>
       <p:nvGrpSpPr>
-        <p:cNvPr id="98" name="Shape 98"/>
+        <p:cNvPr id="95" name="Shape 95"/>
         <p:cNvGrpSpPr/>
         <p:nvPr/>
       </p:nvGrpSpPr>
@@ -12646,7 +12163,7 @@
       </p:grpSpPr>
       <p:pic>
         <p:nvPicPr>
-          <p:cNvPr id="99" name="Google Shape;99;g34735e9ccf9_10_123"/>
+          <p:cNvPr id="96" name="Google Shape;96;g34735e9ccf9_10_123"/>
           <p:cNvPicPr preferRelativeResize="0"/>
           <p:nvPr/>
         </p:nvPicPr>
@@ -12673,7 +12190,7 @@
       </p:pic>
       <p:sp>
         <p:nvSpPr>
-          <p:cNvPr id="100" name="Google Shape;100;g34735e9ccf9_10_123"/>
+          <p:cNvPr id="97" name="Google Shape;97;g34735e9ccf9_10_123"/>
           <p:cNvSpPr txBox="1"/>
           <p:nvPr>
             <p:ph type="title"/>
@@ -12713,7 +12230,7 @@
       </p:sp>
       <p:sp>
         <p:nvSpPr>
-          <p:cNvPr id="101" name="Google Shape;101;g34735e9ccf9_10_123"/>
+          <p:cNvPr id="98" name="Google Shape;98;g34735e9ccf9_10_123"/>
           <p:cNvSpPr txBox="1"/>
           <p:nvPr>
             <p:ph idx="1" type="body"/>
@@ -12812,7 +12329,7 @@
       </p:sp>
       <p:sp>
         <p:nvSpPr>
-          <p:cNvPr id="102" name="Google Shape;102;g34735e9ccf9_10_123"/>
+          <p:cNvPr id="99" name="Google Shape;99;g34735e9ccf9_10_123"/>
           <p:cNvSpPr txBox="1"/>
           <p:nvPr>
             <p:ph idx="1" type="body"/>
@@ -12867,7 +12384,7 @@
       </p:sp>
       <p:pic>
         <p:nvPicPr>
-          <p:cNvPr id="103" name="Google Shape;103;g34735e9ccf9_10_123" title="스크린샷 2025-03-31 오후 6.17.19.png"/>
+          <p:cNvPr id="100" name="Google Shape;100;g34735e9ccf9_10_123" title="스크린샷 2025-03-31 오후 6.17.19.png"/>
           <p:cNvPicPr preferRelativeResize="0"/>
           <p:nvPr/>
         </p:nvPicPr>
@@ -12895,7 +12412,7 @@
       </p:pic>
       <p:pic>
         <p:nvPicPr>
-          <p:cNvPr id="104" name="Google Shape;104;g34735e9ccf9_10_123" title="스크린샷 2025-03-31 오후 6.18.01.png"/>
+          <p:cNvPr id="101" name="Google Shape;101;g34735e9ccf9_10_123" title="스크린샷 2025-03-31 오후 6.18.01.png"/>
           <p:cNvPicPr preferRelativeResize="0"/>
           <p:nvPr/>
         </p:nvPicPr>
@@ -12923,7 +12440,7 @@
       </p:pic>
       <p:sp>
         <p:nvSpPr>
-          <p:cNvPr id="105" name="Google Shape;105;g34735e9ccf9_10_123"/>
+          <p:cNvPr id="102" name="Google Shape;102;g34735e9ccf9_10_123"/>
           <p:cNvSpPr txBox="1"/>
           <p:nvPr/>
         </p:nvSpPr>
@@ -13073,7 +12590,7 @@
       </p:sp>
       <p:sp>
         <p:nvSpPr>
-          <p:cNvPr id="106" name="Google Shape;106;g34735e9ccf9_10_123"/>
+          <p:cNvPr id="103" name="Google Shape;103;g34735e9ccf9_10_123"/>
           <p:cNvSpPr txBox="1"/>
           <p:nvPr/>
         </p:nvSpPr>
@@ -13203,7 +12720,7 @@
   <p:cSld>
     <p:spTree>
       <p:nvGrpSpPr>
-        <p:cNvPr id="110" name="Shape 110"/>
+        <p:cNvPr id="107" name="Shape 107"/>
         <p:cNvGrpSpPr/>
         <p:nvPr/>
       </p:nvGrpSpPr>
@@ -13217,7 +12734,7 @@
       </p:grpSpPr>
       <p:pic>
         <p:nvPicPr>
-          <p:cNvPr id="111" name="Google Shape;111;g34735e9ccf9_10_140"/>
+          <p:cNvPr id="108" name="Google Shape;108;g34735e9ccf9_10_140"/>
           <p:cNvPicPr preferRelativeResize="0"/>
           <p:nvPr/>
         </p:nvPicPr>
@@ -13244,7 +12761,7 @@
       </p:pic>
       <p:sp>
         <p:nvSpPr>
-          <p:cNvPr id="112" name="Google Shape;112;g34735e9ccf9_10_140"/>
+          <p:cNvPr id="109" name="Google Shape;109;g34735e9ccf9_10_140"/>
           <p:cNvSpPr txBox="1"/>
           <p:nvPr>
             <p:ph type="title"/>
@@ -13284,7 +12801,7 @@
       </p:sp>
       <p:sp>
         <p:nvSpPr>
-          <p:cNvPr id="113" name="Google Shape;113;g34735e9ccf9_10_140"/>
+          <p:cNvPr id="110" name="Google Shape;110;g34735e9ccf9_10_140"/>
           <p:cNvSpPr txBox="1"/>
           <p:nvPr>
             <p:ph idx="1" type="body"/>
@@ -13623,7 +13140,7 @@
   <p:cSld>
     <p:spTree>
       <p:nvGrpSpPr>
-        <p:cNvPr id="117" name="Shape 117"/>
+        <p:cNvPr id="114" name="Shape 114"/>
         <p:cNvGrpSpPr/>
         <p:nvPr/>
       </p:nvGrpSpPr>
@@ -13637,7 +13154,7 @@
       </p:grpSpPr>
       <p:sp>
         <p:nvSpPr>
-          <p:cNvPr id="118" name="Google Shape;118;g34735e9ccf9_8_13"/>
+          <p:cNvPr id="115" name="Google Shape;115;g34735e9ccf9_8_13"/>
           <p:cNvSpPr txBox="1"/>
           <p:nvPr>
             <p:ph type="title"/>
@@ -13677,7 +13194,7 @@
       </p:sp>
       <p:graphicFrame>
         <p:nvGraphicFramePr>
-          <p:cNvPr id="119" name="Google Shape;119;g34735e9ccf9_8_13"/>
+          <p:cNvPr id="116" name="Google Shape;116;g34735e9ccf9_8_13"/>
           <p:cNvGraphicFramePr/>
           <p:nvPr/>
         </p:nvGraphicFramePr>
@@ -13690,7 +13207,7 @@
             <a:tbl>
               <a:tblPr>
                 <a:noFill/>
-                <a:tableStyleId>{88496379-2F58-450E-A556-29AA8DE8CB09}</a:tableStyleId>
+                <a:tableStyleId>{26B1D847-3455-4376-BB11-FE7665B2B726}</a:tableStyleId>
               </a:tblPr>
               <a:tblGrid>
                 <a:gridCol w="1987025"/>
@@ -16920,7 +16437,7 @@
       </p:graphicFrame>
       <p:pic>
         <p:nvPicPr>
-          <p:cNvPr id="120" name="Google Shape;120;g34735e9ccf9_8_13"/>
+          <p:cNvPr id="117" name="Google Shape;117;g34735e9ccf9_8_13"/>
           <p:cNvPicPr preferRelativeResize="0"/>
           <p:nvPr/>
         </p:nvPicPr>
@@ -16958,7 +16475,7 @@
   <p:cSld>
     <p:spTree>
       <p:nvGrpSpPr>
-        <p:cNvPr id="124" name="Shape 124"/>
+        <p:cNvPr id="121" name="Shape 121"/>
         <p:cNvGrpSpPr/>
         <p:nvPr/>
       </p:nvGrpSpPr>
@@ -16972,7 +16489,7 @@
       </p:grpSpPr>
       <p:sp>
         <p:nvSpPr>
-          <p:cNvPr id="125" name="Google Shape;125;g34735e9ccf9_8_21"/>
+          <p:cNvPr id="122" name="Google Shape;122;g34735e9ccf9_8_21"/>
           <p:cNvSpPr txBox="1"/>
           <p:nvPr>
             <p:ph type="title"/>
@@ -17012,7 +16529,7 @@
       </p:sp>
       <p:graphicFrame>
         <p:nvGraphicFramePr>
-          <p:cNvPr id="126" name="Google Shape;126;g34735e9ccf9_8_21"/>
+          <p:cNvPr id="123" name="Google Shape;123;g34735e9ccf9_8_21"/>
           <p:cNvGraphicFramePr/>
           <p:nvPr/>
         </p:nvGraphicFramePr>
@@ -17025,7 +16542,7 @@
             <a:tbl>
               <a:tblPr>
                 <a:noFill/>
-                <a:tableStyleId>{88496379-2F58-450E-A556-29AA8DE8CB09}</a:tableStyleId>
+                <a:tableStyleId>{26B1D847-3455-4376-BB11-FE7665B2B726}</a:tableStyleId>
               </a:tblPr>
               <a:tblGrid>
                 <a:gridCol w="1501900"/>
@@ -20909,7 +20426,7 @@
   <p:cSld>
     <p:spTree>
       <p:nvGrpSpPr>
-        <p:cNvPr id="130" name="Shape 130"/>
+        <p:cNvPr id="127" name="Shape 127"/>
         <p:cNvGrpSpPr/>
         <p:nvPr/>
       </p:nvGrpSpPr>
@@ -20923,7 +20440,7 @@
       </p:grpSpPr>
       <p:pic>
         <p:nvPicPr>
-          <p:cNvPr id="131" name="Google Shape;131;g34735e9ccf9_10_160"/>
+          <p:cNvPr id="128" name="Google Shape;128;g34735e9ccf9_10_160"/>
           <p:cNvPicPr preferRelativeResize="0"/>
           <p:nvPr/>
         </p:nvPicPr>
@@ -20950,7 +20467,7 @@
       </p:pic>
       <p:sp>
         <p:nvSpPr>
-          <p:cNvPr id="132" name="Google Shape;132;g34735e9ccf9_10_160"/>
+          <p:cNvPr id="129" name="Google Shape;129;g34735e9ccf9_10_160"/>
           <p:cNvSpPr txBox="1"/>
           <p:nvPr>
             <p:ph type="title"/>
@@ -21002,7 +20519,7 @@
       </p:sp>
       <p:sp>
         <p:nvSpPr>
-          <p:cNvPr id="133" name="Google Shape;133;g34735e9ccf9_10_160"/>
+          <p:cNvPr id="130" name="Google Shape;130;g34735e9ccf9_10_160"/>
           <p:cNvSpPr txBox="1"/>
           <p:nvPr>
             <p:ph idx="1" type="body"/>
@@ -21196,7 +20713,7 @@
   <p:cSld>
     <p:spTree>
       <p:nvGrpSpPr>
-        <p:cNvPr id="137" name="Shape 137"/>
+        <p:cNvPr id="134" name="Shape 134"/>
         <p:cNvGrpSpPr/>
         <p:nvPr/>
       </p:nvGrpSpPr>
@@ -21210,7 +20727,7 @@
       </p:grpSpPr>
       <p:pic>
         <p:nvPicPr>
-          <p:cNvPr id="138" name="Google Shape;138;g34735e9ccf9_10_167"/>
+          <p:cNvPr id="135" name="Google Shape;135;g34735e9ccf9_10_167"/>
           <p:cNvPicPr preferRelativeResize="0"/>
           <p:nvPr/>
         </p:nvPicPr>
@@ -21237,7 +20754,7 @@
       </p:pic>
       <p:sp>
         <p:nvSpPr>
-          <p:cNvPr id="139" name="Google Shape;139;g34735e9ccf9_10_167"/>
+          <p:cNvPr id="136" name="Google Shape;136;g34735e9ccf9_10_167"/>
           <p:cNvSpPr txBox="1"/>
           <p:nvPr>
             <p:ph type="title"/>
@@ -21285,14 +20802,14 @@
       </p:sp>
       <p:sp>
         <p:nvSpPr>
-          <p:cNvPr id="140" name="Google Shape;140;g34735e9ccf9_10_167"/>
+          <p:cNvPr id="137" name="Google Shape;137;g34735e9ccf9_10_167"/>
           <p:cNvSpPr txBox="1"/>
           <p:nvPr/>
         </p:nvSpPr>
         <p:spPr>
           <a:xfrm>
             <a:off x="889175" y="913525"/>
-            <a:ext cx="6263100" cy="4732500"/>
+            <a:ext cx="6263100" cy="4449000"/>
           </a:xfrm>
           <a:prstGeom prst="rect">
             <a:avLst/>
@@ -21516,7 +21033,7 @@
                   <a:schemeClr val="dk1"/>
                 </a:solidFill>
               </a:rPr>
-              <a:t>Testimonies </a:t>
+              <a:t>Testimonies</a:t>
             </a:r>
             <a:endParaRPr sz="1600">
               <a:solidFill>
@@ -21668,37 +21185,6 @@
                 </a:solidFill>
               </a:rPr>
               <a:t>Efficiency in Vetting Donors</a:t>
-            </a:r>
-            <a:endParaRPr sz="1600">
-              <a:solidFill>
-                <a:schemeClr val="dk1"/>
-              </a:solidFill>
-            </a:endParaRPr>
-          </a:p>
-          <a:p>
-            <a:pPr indent="-330200" lvl="0" marL="457200" rtl="0" algn="l">
-              <a:lnSpc>
-                <a:spcPct val="115000"/>
-              </a:lnSpc>
-              <a:spcBef>
-                <a:spcPts val="0"/>
-              </a:spcBef>
-              <a:spcAft>
-                <a:spcPts val="0"/>
-              </a:spcAft>
-              <a:buClr>
-                <a:schemeClr val="dk1"/>
-              </a:buClr>
-              <a:buSzPts val="1600"/>
-              <a:buChar char="●"/>
-            </a:pPr>
-            <a:r>
-              <a:rPr lang="en-US" sz="1600">
-                <a:solidFill>
-                  <a:schemeClr val="dk1"/>
-                </a:solidFill>
-              </a:rPr>
-              <a:t>Acquisition ($3–$10M target)</a:t>
             </a:r>
             <a:endParaRPr sz="1600">
               <a:solidFill>
@@ -21803,7 +21289,7 @@
       </p:sp>
       <p:sp>
         <p:nvSpPr>
-          <p:cNvPr id="141" name="Google Shape;141;g34735e9ccf9_10_167"/>
+          <p:cNvPr id="138" name="Google Shape;138;g34735e9ccf9_10_167"/>
           <p:cNvSpPr txBox="1"/>
           <p:nvPr>
             <p:ph idx="1" type="body"/>
@@ -22099,6 +21585,285 @@
 </file>
 
 <file path=ppt/theme/theme1.xml><?xml version="1.0" encoding="utf-8"?>
+<a:theme xmlns:a="http://schemas.openxmlformats.org/drawingml/2006/main" xmlns:r="http://schemas.openxmlformats.org/officeDocument/2006/relationships">
+  <a:themeElements>
+    <a:clrScheme name="Default">
+      <a:dk1>
+        <a:srgbClr val="000000"/>
+      </a:dk1>
+      <a:lt1>
+        <a:srgbClr val="FFFFFF"/>
+      </a:lt1>
+      <a:dk2>
+        <a:srgbClr val="158158"/>
+      </a:dk2>
+      <a:lt2>
+        <a:srgbClr val="F3F3F3"/>
+      </a:lt2>
+      <a:accent1>
+        <a:srgbClr val="058DC7"/>
+      </a:accent1>
+      <a:accent2>
+        <a:srgbClr val="50B432"/>
+      </a:accent2>
+      <a:accent3>
+        <a:srgbClr val="ED561B"/>
+      </a:accent3>
+      <a:accent4>
+        <a:srgbClr val="EDEF00"/>
+      </a:accent4>
+      <a:accent5>
+        <a:srgbClr val="24CBE5"/>
+      </a:accent5>
+      <a:accent6>
+        <a:srgbClr val="64E572"/>
+      </a:accent6>
+      <a:hlink>
+        <a:srgbClr val="2200CC"/>
+      </a:hlink>
+      <a:folHlink>
+        <a:srgbClr val="551A8B"/>
+      </a:folHlink>
+    </a:clrScheme>
+    <a:fontScheme name="Office">
+      <a:majorFont>
+        <a:latin typeface="Arial"/>
+        <a:ea typeface=""/>
+        <a:cs typeface=""/>
+        <a:font script="Jpan" typeface="ＭＳ Ｐゴシック"/>
+        <a:font script="Hang" typeface="맑은 고딕"/>
+        <a:font script="Hans" typeface="宋体"/>
+        <a:font script="Hant" typeface="新細明體"/>
+        <a:font script="Arab" typeface="Times New Roman"/>
+        <a:font script="Hebr" typeface="Times New Roman"/>
+        <a:font script="Thai" typeface="Angsana New"/>
+        <a:font script="Ethi" typeface="Nyala"/>
+        <a:font script="Beng" typeface="Vrinda"/>
+        <a:font script="Gujr" typeface="Shruti"/>
+        <a:font script="Khmr" typeface="MoolBoran"/>
+        <a:font script="Knda" typeface="Tunga"/>
+        <a:font script="Guru" typeface="Raavi"/>
+        <a:font script="Cans" typeface="Euphemia"/>
+        <a:font script="Cher" typeface="Plantagenet Cherokee"/>
+        <a:font script="Yiii" typeface="Microsoft Yi Baiti"/>
+        <a:font script="Tibt" typeface="Microsoft Himalaya"/>
+        <a:font script="Thaa" typeface="MV Boli"/>
+        <a:font script="Deva" typeface="Mangal"/>
+        <a:font script="Telu" typeface="Gautami"/>
+        <a:font script="Taml" typeface="Latha"/>
+        <a:font script="Syrc" typeface="Estrangelo Edessa"/>
+        <a:font script="Orya" typeface="Kalinga"/>
+        <a:font script="Mlym" typeface="Kartika"/>
+        <a:font script="Laoo" typeface="DokChampa"/>
+        <a:font script="Sinh" typeface="Iskoola Pota"/>
+        <a:font script="Mong" typeface="Mongolian Baiti"/>
+        <a:font script="Viet" typeface="Times New Roman"/>
+        <a:font script="Uigh" typeface="Microsoft Uighur"/>
+        <a:font script="Geor" typeface="Sylfaen"/>
+      </a:majorFont>
+      <a:minorFont>
+        <a:latin typeface="Arial"/>
+        <a:ea typeface=""/>
+        <a:cs typeface=""/>
+        <a:font script="Jpan" typeface="ＭＳ Ｐゴシック"/>
+        <a:font script="Hang" typeface="맑은 고딕"/>
+        <a:font script="Hans" typeface="宋体"/>
+        <a:font script="Hant" typeface="新細明體"/>
+        <a:font script="Arab" typeface="Arial"/>
+        <a:font script="Hebr" typeface="Arial"/>
+        <a:font script="Thai" typeface="Cordia New"/>
+        <a:font script="Ethi" typeface="Nyala"/>
+        <a:font script="Beng" typeface="Vrinda"/>
+        <a:font script="Gujr" typeface="Shruti"/>
+        <a:font script="Khmr" typeface="DaunPenh"/>
+        <a:font script="Knda" typeface="Tunga"/>
+        <a:font script="Guru" typeface="Raavi"/>
+        <a:font script="Cans" typeface="Euphemia"/>
+        <a:font script="Cher" typeface="Plantagenet Cherokee"/>
+        <a:font script="Yiii" typeface="Microsoft Yi Baiti"/>
+        <a:font script="Tibt" typeface="Microsoft Himalaya"/>
+        <a:font script="Thaa" typeface="MV Boli"/>
+        <a:font script="Deva" typeface="Mangal"/>
+        <a:font script="Telu" typeface="Gautami"/>
+        <a:font script="Taml" typeface="Latha"/>
+        <a:font script="Syrc" typeface="Estrangelo Edessa"/>
+        <a:font script="Orya" typeface="Kalinga"/>
+        <a:font script="Mlym" typeface="Kartika"/>
+        <a:font script="Laoo" typeface="DokChampa"/>
+        <a:font script="Sinh" typeface="Iskoola Pota"/>
+        <a:font script="Mong" typeface="Mongolian Baiti"/>
+        <a:font script="Viet" typeface="Arial"/>
+        <a:font script="Uigh" typeface="Microsoft Uighur"/>
+        <a:font script="Geor" typeface="Sylfaen"/>
+      </a:minorFont>
+    </a:fontScheme>
+    <a:fmtScheme name="Office">
+      <a:fillStyleLst>
+        <a:solidFill>
+          <a:schemeClr val="phClr"/>
+        </a:solidFill>
+        <a:gradFill rotWithShape="1">
+          <a:gsLst>
+            <a:gs pos="0">
+              <a:schemeClr val="phClr">
+                <a:tint val="50000"/>
+                <a:satMod val="300000"/>
+              </a:schemeClr>
+            </a:gs>
+            <a:gs pos="35000">
+              <a:schemeClr val="phClr">
+                <a:tint val="37000"/>
+                <a:satMod val="300000"/>
+              </a:schemeClr>
+            </a:gs>
+            <a:gs pos="100000">
+              <a:schemeClr val="phClr">
+                <a:tint val="15000"/>
+                <a:satMod val="350000"/>
+              </a:schemeClr>
+            </a:gs>
+          </a:gsLst>
+          <a:lin ang="16200000" scaled="1"/>
+        </a:gradFill>
+        <a:gradFill rotWithShape="1">
+          <a:gsLst>
+            <a:gs pos="0">
+              <a:schemeClr val="phClr">
+                <a:tint val="100000"/>
+                <a:shade val="100000"/>
+                <a:satMod val="130000"/>
+              </a:schemeClr>
+            </a:gs>
+            <a:gs pos="100000">
+              <a:schemeClr val="phClr">
+                <a:tint val="50000"/>
+                <a:shade val="100000"/>
+                <a:satMod val="350000"/>
+              </a:schemeClr>
+            </a:gs>
+          </a:gsLst>
+          <a:lin ang="16200000" scaled="0"/>
+        </a:gradFill>
+      </a:fillStyleLst>
+      <a:lnStyleLst>
+        <a:ln w="9525" cap="flat" cmpd="sng" algn="ctr">
+          <a:solidFill>
+            <a:schemeClr val="phClr">
+              <a:shade val="95000"/>
+              <a:satMod val="105000"/>
+            </a:schemeClr>
+          </a:solidFill>
+          <a:prstDash val="solid"/>
+        </a:ln>
+        <a:ln w="25400" cap="flat" cmpd="sng" algn="ctr">
+          <a:solidFill>
+            <a:schemeClr val="phClr"/>
+          </a:solidFill>
+          <a:prstDash val="solid"/>
+        </a:ln>
+        <a:ln w="38100" cap="flat" cmpd="sng" algn="ctr">
+          <a:solidFill>
+            <a:schemeClr val="phClr"/>
+          </a:solidFill>
+          <a:prstDash val="solid"/>
+        </a:ln>
+      </a:lnStyleLst>
+      <a:effectStyleLst>
+        <a:effectStyle>
+          <a:effectLst>
+            <a:outerShdw blurRad="40000" dist="20000" dir="5400000" rotWithShape="0">
+              <a:srgbClr val="000000">
+                <a:alpha val="38000"/>
+              </a:srgbClr>
+            </a:outerShdw>
+          </a:effectLst>
+        </a:effectStyle>
+        <a:effectStyle>
+          <a:effectLst>
+            <a:outerShdw blurRad="40000" dist="23000" dir="5400000" rotWithShape="0">
+              <a:srgbClr val="000000">
+                <a:alpha val="35000"/>
+              </a:srgbClr>
+            </a:outerShdw>
+          </a:effectLst>
+        </a:effectStyle>
+        <a:effectStyle>
+          <a:effectLst>
+            <a:outerShdw blurRad="40000" dist="23000" dir="5400000" rotWithShape="0">
+              <a:srgbClr val="000000">
+                <a:alpha val="35000"/>
+              </a:srgbClr>
+            </a:outerShdw>
+          </a:effectLst>
+          <a:scene3d>
+            <a:camera prst="orthographicFront">
+              <a:rot lat="0" lon="0" rev="0"/>
+            </a:camera>
+            <a:lightRig rig="threePt" dir="t">
+              <a:rot lat="0" lon="0" rev="1200000"/>
+            </a:lightRig>
+          </a:scene3d>
+          <a:sp3d>
+            <a:bevelT w="63500" h="25400"/>
+          </a:sp3d>
+        </a:effectStyle>
+      </a:effectStyleLst>
+      <a:bgFillStyleLst>
+        <a:solidFill>
+          <a:schemeClr val="phClr"/>
+        </a:solidFill>
+        <a:gradFill rotWithShape="1">
+          <a:gsLst>
+            <a:gs pos="0">
+              <a:schemeClr val="phClr">
+                <a:tint val="40000"/>
+                <a:satMod val="350000"/>
+              </a:schemeClr>
+            </a:gs>
+            <a:gs pos="40000">
+              <a:schemeClr val="phClr">
+                <a:tint val="45000"/>
+                <a:shade val="99000"/>
+                <a:satMod val="350000"/>
+              </a:schemeClr>
+            </a:gs>
+            <a:gs pos="100000">
+              <a:schemeClr val="phClr">
+                <a:shade val="20000"/>
+                <a:satMod val="255000"/>
+              </a:schemeClr>
+            </a:gs>
+          </a:gsLst>
+          <a:path path="circle">
+            <a:fillToRect l="50000" t="-80000" r="50000" b="180000"/>
+          </a:path>
+        </a:gradFill>
+        <a:gradFill rotWithShape="1">
+          <a:gsLst>
+            <a:gs pos="0">
+              <a:schemeClr val="phClr">
+                <a:tint val="80000"/>
+                <a:satMod val="300000"/>
+              </a:schemeClr>
+            </a:gs>
+            <a:gs pos="100000">
+              <a:schemeClr val="phClr">
+                <a:shade val="30000"/>
+                <a:satMod val="200000"/>
+              </a:schemeClr>
+            </a:gs>
+          </a:gsLst>
+          <a:path path="circle">
+            <a:fillToRect l="50000" t="50000" r="50000" b="50000"/>
+          </a:path>
+        </a:gradFill>
+      </a:bgFillStyleLst>
+    </a:fmtScheme>
+  </a:themeElements>
+</a:theme>
+</file>
+
+<file path=ppt/theme/theme2.xml><?xml version="1.0" encoding="utf-8"?>
 <a:theme xmlns:a="http://schemas.openxmlformats.org/drawingml/2006/main" xmlns:r="http://schemas.openxmlformats.org/officeDocument/2006/relationships" name="Office Theme">
   <a:themeElements>
     <a:clrScheme name="Office">
@@ -22375,283 +22140,4 @@
     </a:fmtScheme>
   </a:themeElements>
 </a:theme>
-</file>
-
-<file path=ppt/theme/theme2.xml><?xml version="1.0" encoding="utf-8"?>
-<a:theme xmlns:a="http://schemas.openxmlformats.org/drawingml/2006/main" xmlns:r="http://schemas.openxmlformats.org/officeDocument/2006/relationships">
-  <a:themeElements>
-    <a:clrScheme name="Default">
-      <a:dk1>
-        <a:srgbClr val="000000"/>
-      </a:dk1>
-      <a:lt1>
-        <a:srgbClr val="FFFFFF"/>
-      </a:lt1>
-      <a:dk2>
-        <a:srgbClr val="158158"/>
-      </a:dk2>
-      <a:lt2>
-        <a:srgbClr val="F3F3F3"/>
-      </a:lt2>
-      <a:accent1>
-        <a:srgbClr val="058DC7"/>
-      </a:accent1>
-      <a:accent2>
-        <a:srgbClr val="50B432"/>
-      </a:accent2>
-      <a:accent3>
-        <a:srgbClr val="ED561B"/>
-      </a:accent3>
-      <a:accent4>
-        <a:srgbClr val="EDEF00"/>
-      </a:accent4>
-      <a:accent5>
-        <a:srgbClr val="24CBE5"/>
-      </a:accent5>
-      <a:accent6>
-        <a:srgbClr val="64E572"/>
-      </a:accent6>
-      <a:hlink>
-        <a:srgbClr val="2200CC"/>
-      </a:hlink>
-      <a:folHlink>
-        <a:srgbClr val="551A8B"/>
-      </a:folHlink>
-    </a:clrScheme>
-    <a:fontScheme name="Office">
-      <a:majorFont>
-        <a:latin typeface="Arial"/>
-        <a:ea typeface=""/>
-        <a:cs typeface=""/>
-        <a:font script="Jpan" typeface="ＭＳ Ｐゴシック"/>
-        <a:font script="Hang" typeface="맑은 고딕"/>
-        <a:font script="Hans" typeface="宋体"/>
-        <a:font script="Hant" typeface="新細明體"/>
-        <a:font script="Arab" typeface="Times New Roman"/>
-        <a:font script="Hebr" typeface="Times New Roman"/>
-        <a:font script="Thai" typeface="Angsana New"/>
-        <a:font script="Ethi" typeface="Nyala"/>
-        <a:font script="Beng" typeface="Vrinda"/>
-        <a:font script="Gujr" typeface="Shruti"/>
-        <a:font script="Khmr" typeface="MoolBoran"/>
-        <a:font script="Knda" typeface="Tunga"/>
-        <a:font script="Guru" typeface="Raavi"/>
-        <a:font script="Cans" typeface="Euphemia"/>
-        <a:font script="Cher" typeface="Plantagenet Cherokee"/>
-        <a:font script="Yiii" typeface="Microsoft Yi Baiti"/>
-        <a:font script="Tibt" typeface="Microsoft Himalaya"/>
-        <a:font script="Thaa" typeface="MV Boli"/>
-        <a:font script="Deva" typeface="Mangal"/>
-        <a:font script="Telu" typeface="Gautami"/>
-        <a:font script="Taml" typeface="Latha"/>
-        <a:font script="Syrc" typeface="Estrangelo Edessa"/>
-        <a:font script="Orya" typeface="Kalinga"/>
-        <a:font script="Mlym" typeface="Kartika"/>
-        <a:font script="Laoo" typeface="DokChampa"/>
-        <a:font script="Sinh" typeface="Iskoola Pota"/>
-        <a:font script="Mong" typeface="Mongolian Baiti"/>
-        <a:font script="Viet" typeface="Times New Roman"/>
-        <a:font script="Uigh" typeface="Microsoft Uighur"/>
-        <a:font script="Geor" typeface="Sylfaen"/>
-      </a:majorFont>
-      <a:minorFont>
-        <a:latin typeface="Arial"/>
-        <a:ea typeface=""/>
-        <a:cs typeface=""/>
-        <a:font script="Jpan" typeface="ＭＳ Ｐゴシック"/>
-        <a:font script="Hang" typeface="맑은 고딕"/>
-        <a:font script="Hans" typeface="宋体"/>
-        <a:font script="Hant" typeface="新細明體"/>
-        <a:font script="Arab" typeface="Arial"/>
-        <a:font script="Hebr" typeface="Arial"/>
-        <a:font script="Thai" typeface="Cordia New"/>
-        <a:font script="Ethi" typeface="Nyala"/>
-        <a:font script="Beng" typeface="Vrinda"/>
-        <a:font script="Gujr" typeface="Shruti"/>
-        <a:font script="Khmr" typeface="DaunPenh"/>
-        <a:font script="Knda" typeface="Tunga"/>
-        <a:font script="Guru" typeface="Raavi"/>
-        <a:font script="Cans" typeface="Euphemia"/>
-        <a:font script="Cher" typeface="Plantagenet Cherokee"/>
-        <a:font script="Yiii" typeface="Microsoft Yi Baiti"/>
-        <a:font script="Tibt" typeface="Microsoft Himalaya"/>
-        <a:font script="Thaa" typeface="MV Boli"/>
-        <a:font script="Deva" typeface="Mangal"/>
-        <a:font script="Telu" typeface="Gautami"/>
-        <a:font script="Taml" typeface="Latha"/>
-        <a:font script="Syrc" typeface="Estrangelo Edessa"/>
-        <a:font script="Orya" typeface="Kalinga"/>
-        <a:font script="Mlym" typeface="Kartika"/>
-        <a:font script="Laoo" typeface="DokChampa"/>
-        <a:font script="Sinh" typeface="Iskoola Pota"/>
-        <a:font script="Mong" typeface="Mongolian Baiti"/>
-        <a:font script="Viet" typeface="Arial"/>
-        <a:font script="Uigh" typeface="Microsoft Uighur"/>
-        <a:font script="Geor" typeface="Sylfaen"/>
-      </a:minorFont>
-    </a:fontScheme>
-    <a:fmtScheme name="Office">
-      <a:fillStyleLst>
-        <a:solidFill>
-          <a:schemeClr val="phClr"/>
-        </a:solidFill>
-        <a:gradFill rotWithShape="1">
-          <a:gsLst>
-            <a:gs pos="0">
-              <a:schemeClr val="phClr">
-                <a:tint val="50000"/>
-                <a:satMod val="300000"/>
-              </a:schemeClr>
-            </a:gs>
-            <a:gs pos="35000">
-              <a:schemeClr val="phClr">
-                <a:tint val="37000"/>
-                <a:satMod val="300000"/>
-              </a:schemeClr>
-            </a:gs>
-            <a:gs pos="100000">
-              <a:schemeClr val="phClr">
-                <a:tint val="15000"/>
-                <a:satMod val="350000"/>
-              </a:schemeClr>
-            </a:gs>
-          </a:gsLst>
-          <a:lin ang="16200000" scaled="1"/>
-        </a:gradFill>
-        <a:gradFill rotWithShape="1">
-          <a:gsLst>
-            <a:gs pos="0">
-              <a:schemeClr val="phClr">
-                <a:tint val="100000"/>
-                <a:shade val="100000"/>
-                <a:satMod val="130000"/>
-              </a:schemeClr>
-            </a:gs>
-            <a:gs pos="100000">
-              <a:schemeClr val="phClr">
-                <a:tint val="50000"/>
-                <a:shade val="100000"/>
-                <a:satMod val="350000"/>
-              </a:schemeClr>
-            </a:gs>
-          </a:gsLst>
-          <a:lin ang="16200000" scaled="0"/>
-        </a:gradFill>
-      </a:fillStyleLst>
-      <a:lnStyleLst>
-        <a:ln w="9525" cap="flat" cmpd="sng" algn="ctr">
-          <a:solidFill>
-            <a:schemeClr val="phClr">
-              <a:shade val="95000"/>
-              <a:satMod val="105000"/>
-            </a:schemeClr>
-          </a:solidFill>
-          <a:prstDash val="solid"/>
-        </a:ln>
-        <a:ln w="25400" cap="flat" cmpd="sng" algn="ctr">
-          <a:solidFill>
-            <a:schemeClr val="phClr"/>
-          </a:solidFill>
-          <a:prstDash val="solid"/>
-        </a:ln>
-        <a:ln w="38100" cap="flat" cmpd="sng" algn="ctr">
-          <a:solidFill>
-            <a:schemeClr val="phClr"/>
-          </a:solidFill>
-          <a:prstDash val="solid"/>
-        </a:ln>
-      </a:lnStyleLst>
-      <a:effectStyleLst>
-        <a:effectStyle>
-          <a:effectLst>
-            <a:outerShdw blurRad="40000" dist="20000" dir="5400000" rotWithShape="0">
-              <a:srgbClr val="000000">
-                <a:alpha val="38000"/>
-              </a:srgbClr>
-            </a:outerShdw>
-          </a:effectLst>
-        </a:effectStyle>
-        <a:effectStyle>
-          <a:effectLst>
-            <a:outerShdw blurRad="40000" dist="23000" dir="5400000" rotWithShape="0">
-              <a:srgbClr val="000000">
-                <a:alpha val="35000"/>
-              </a:srgbClr>
-            </a:outerShdw>
-          </a:effectLst>
-        </a:effectStyle>
-        <a:effectStyle>
-          <a:effectLst>
-            <a:outerShdw blurRad="40000" dist="23000" dir="5400000" rotWithShape="0">
-              <a:srgbClr val="000000">
-                <a:alpha val="35000"/>
-              </a:srgbClr>
-            </a:outerShdw>
-          </a:effectLst>
-          <a:scene3d>
-            <a:camera prst="orthographicFront">
-              <a:rot lat="0" lon="0" rev="0"/>
-            </a:camera>
-            <a:lightRig rig="threePt" dir="t">
-              <a:rot lat="0" lon="0" rev="1200000"/>
-            </a:lightRig>
-          </a:scene3d>
-          <a:sp3d>
-            <a:bevelT w="63500" h="25400"/>
-          </a:sp3d>
-        </a:effectStyle>
-      </a:effectStyleLst>
-      <a:bgFillStyleLst>
-        <a:solidFill>
-          <a:schemeClr val="phClr"/>
-        </a:solidFill>
-        <a:gradFill rotWithShape="1">
-          <a:gsLst>
-            <a:gs pos="0">
-              <a:schemeClr val="phClr">
-                <a:tint val="40000"/>
-                <a:satMod val="350000"/>
-              </a:schemeClr>
-            </a:gs>
-            <a:gs pos="40000">
-              <a:schemeClr val="phClr">
-                <a:tint val="45000"/>
-                <a:shade val="99000"/>
-                <a:satMod val="350000"/>
-              </a:schemeClr>
-            </a:gs>
-            <a:gs pos="100000">
-              <a:schemeClr val="phClr">
-                <a:shade val="20000"/>
-                <a:satMod val="255000"/>
-              </a:schemeClr>
-            </a:gs>
-          </a:gsLst>
-          <a:path path="circle">
-            <a:fillToRect l="50000" t="-80000" r="50000" b="180000"/>
-          </a:path>
-        </a:gradFill>
-        <a:gradFill rotWithShape="1">
-          <a:gsLst>
-            <a:gs pos="0">
-              <a:schemeClr val="phClr">
-                <a:tint val="80000"/>
-                <a:satMod val="300000"/>
-              </a:schemeClr>
-            </a:gs>
-            <a:gs pos="100000">
-              <a:schemeClr val="phClr">
-                <a:shade val="30000"/>
-                <a:satMod val="200000"/>
-              </a:schemeClr>
-            </a:gs>
-          </a:gsLst>
-          <a:path path="circle">
-            <a:fillToRect l="50000" t="50000" r="50000" b="50000"/>
-          </a:path>
-        </a:gradFill>
-      </a:bgFillStyleLst>
-    </a:fmtScheme>
-  </a:themeElements>
-</a:theme>
 </file>
</xml_diff>